<commit_message>
Sys Arch diagram updated, Presi work started
</commit_message>
<xml_diff>
--- a/Final_Report/InFinalReportEinpflegen (Fuer Jan)/presentation_sample/sample_01.pptx
+++ b/Final_Report/InFinalReportEinpflegen (Fuer Jan)/presentation_sample/sample_01.pptx
@@ -5,7 +5,7 @@
     <p:sldMasterId id="2147483750" r:id="rId1"/>
   </p:sldMasterIdLst>
   <p:notesMasterIdLst>
-    <p:notesMasterId r:id="rId18"/>
+    <p:notesMasterId r:id="rId19"/>
   </p:notesMasterIdLst>
   <p:sldIdLst>
     <p:sldId id="256" r:id="rId2"/>
@@ -13,17 +13,18 @@
     <p:sldId id="257" r:id="rId4"/>
     <p:sldId id="260" r:id="rId5"/>
     <p:sldId id="261" r:id="rId6"/>
-    <p:sldId id="262" r:id="rId7"/>
-    <p:sldId id="263" r:id="rId8"/>
-    <p:sldId id="268" r:id="rId9"/>
-    <p:sldId id="269" r:id="rId10"/>
-    <p:sldId id="270" r:id="rId11"/>
-    <p:sldId id="271" r:id="rId12"/>
-    <p:sldId id="264" r:id="rId13"/>
-    <p:sldId id="265" r:id="rId14"/>
-    <p:sldId id="266" r:id="rId15"/>
-    <p:sldId id="267" r:id="rId16"/>
-    <p:sldId id="258" r:id="rId17"/>
+    <p:sldId id="272" r:id="rId7"/>
+    <p:sldId id="262" r:id="rId8"/>
+    <p:sldId id="263" r:id="rId9"/>
+    <p:sldId id="268" r:id="rId10"/>
+    <p:sldId id="269" r:id="rId11"/>
+    <p:sldId id="270" r:id="rId12"/>
+    <p:sldId id="271" r:id="rId13"/>
+    <p:sldId id="264" r:id="rId14"/>
+    <p:sldId id="265" r:id="rId15"/>
+    <p:sldId id="266" r:id="rId16"/>
+    <p:sldId id="267" r:id="rId17"/>
+    <p:sldId id="258" r:id="rId18"/>
   </p:sldIdLst>
   <p:sldSz cx="9144000" cy="6858000" type="screen4x3"/>
   <p:notesSz cx="6858000" cy="9144000"/>
@@ -639,7 +640,7 @@
           <a:p>
             <a:fld id="{ACA256E8-5C37-4652-B0E1-C5A6E91068A6}" type="slidenum">
               <a:rPr lang="de-DE" smtClean="0"/>
-              <a:t>11</a:t>
+              <a:t>12</a:t>
             </a:fld>
             <a:endParaRPr lang="de-DE"/>
           </a:p>
@@ -728,7 +729,7 @@
           <a:p>
             <a:fld id="{ACA256E8-5C37-4652-B0E1-C5A6E91068A6}" type="slidenum">
               <a:rPr lang="de-DE" smtClean="0"/>
-              <a:t>12</a:t>
+              <a:t>13</a:t>
             </a:fld>
             <a:endParaRPr lang="de-DE"/>
           </a:p>
@@ -817,7 +818,7 @@
           <a:p>
             <a:fld id="{ACA256E8-5C37-4652-B0E1-C5A6E91068A6}" type="slidenum">
               <a:rPr lang="de-DE" smtClean="0"/>
-              <a:t>13</a:t>
+              <a:t>14</a:t>
             </a:fld>
             <a:endParaRPr lang="de-DE"/>
           </a:p>
@@ -906,7 +907,7 @@
           <a:p>
             <a:fld id="{ACA256E8-5C37-4652-B0E1-C5A6E91068A6}" type="slidenum">
               <a:rPr lang="de-DE" smtClean="0"/>
-              <a:t>14</a:t>
+              <a:t>15</a:t>
             </a:fld>
             <a:endParaRPr lang="de-DE"/>
           </a:p>
@@ -995,7 +996,7 @@
           <a:p>
             <a:fld id="{ACA256E8-5C37-4652-B0E1-C5A6E91068A6}" type="slidenum">
               <a:rPr lang="de-DE" smtClean="0"/>
-              <a:t>15</a:t>
+              <a:t>16</a:t>
             </a:fld>
             <a:endParaRPr lang="de-DE"/>
           </a:p>
@@ -1084,7 +1085,7 @@
           <a:p>
             <a:fld id="{ACA256E8-5C37-4652-B0E1-C5A6E91068A6}" type="slidenum">
               <a:rPr lang="de-DE" smtClean="0"/>
-              <a:t>16</a:t>
+              <a:t>17</a:t>
             </a:fld>
             <a:endParaRPr lang="de-DE"/>
           </a:p>
@@ -1440,7 +1441,7 @@
           <a:p>
             <a:fld id="{ACA256E8-5C37-4652-B0E1-C5A6E91068A6}" type="slidenum">
               <a:rPr lang="de-DE" smtClean="0"/>
-              <a:t>6</a:t>
+              <a:t>7</a:t>
             </a:fld>
             <a:endParaRPr lang="de-DE"/>
           </a:p>
@@ -1529,7 +1530,7 @@
           <a:p>
             <a:fld id="{ACA256E8-5C37-4652-B0E1-C5A6E91068A6}" type="slidenum">
               <a:rPr lang="de-DE" smtClean="0"/>
-              <a:t>7</a:t>
+              <a:t>8</a:t>
             </a:fld>
             <a:endParaRPr lang="de-DE"/>
           </a:p>
@@ -1618,7 +1619,7 @@
           <a:p>
             <a:fld id="{ACA256E8-5C37-4652-B0E1-C5A6E91068A6}" type="slidenum">
               <a:rPr lang="de-DE" smtClean="0"/>
-              <a:t>8</a:t>
+              <a:t>9</a:t>
             </a:fld>
             <a:endParaRPr lang="de-DE"/>
           </a:p>
@@ -1707,7 +1708,7 @@
           <a:p>
             <a:fld id="{ACA256E8-5C37-4652-B0E1-C5A6E91068A6}" type="slidenum">
               <a:rPr lang="de-DE" smtClean="0"/>
-              <a:t>9</a:t>
+              <a:t>10</a:t>
             </a:fld>
             <a:endParaRPr lang="de-DE"/>
           </a:p>
@@ -1796,7 +1797,7 @@
           <a:p>
             <a:fld id="{ACA256E8-5C37-4652-B0E1-C5A6E91068A6}" type="slidenum">
               <a:rPr lang="de-DE" smtClean="0"/>
-              <a:t>10</a:t>
+              <a:t>11</a:t>
             </a:fld>
             <a:endParaRPr lang="de-DE"/>
           </a:p>
@@ -4931,7 +4932,7 @@
         <p:spPr>
           <a:xfrm>
             <a:off x="329426" y="1210949"/>
-            <a:ext cx="1265090" cy="553998"/>
+            <a:ext cx="1016625" cy="553998"/>
           </a:xfrm>
           <a:prstGeom prst="rect">
             <a:avLst/>
@@ -4946,7 +4947,7 @@
           <a:p>
             <a:r>
               <a:rPr lang="de-DE" sz="3000" b="1" dirty="0" smtClean="0"/>
-              <a:t>MCAPI</a:t>
+              <a:t>Wi-Fi</a:t>
             </a:r>
             <a:endParaRPr lang="de-DE" sz="3000" b="1" dirty="0"/>
           </a:p>
@@ -5172,11 +5173,7 @@
             </a:r>
             <a:r>
               <a:rPr lang="de-DE" sz="2000" dirty="0" smtClean="0"/>
-              <a:t> Project: </a:t>
-            </a:r>
-            <a:r>
-              <a:rPr lang="de-DE" sz="2000" dirty="0" smtClean="0"/>
-              <a:t>Linux</a:t>
+              <a:t> Project: Linux</a:t>
             </a:r>
             <a:endParaRPr lang="de-DE" sz="2000" dirty="0"/>
           </a:p>
@@ -5277,7 +5274,7 @@
     </p:spTree>
     <p:extLst>
       <p:ext uri="{BB962C8B-B14F-4D97-AF65-F5344CB8AC3E}">
-        <p14:creationId xmlns:p14="http://schemas.microsoft.com/office/powerpoint/2010/main" val="1791922401"/>
+        <p14:creationId xmlns:p14="http://schemas.microsoft.com/office/powerpoint/2010/main" val="650476055"/>
       </p:ext>
     </p:extLst>
   </p:cSld>
@@ -5320,7 +5317,7 @@
         <p:spPr>
           <a:xfrm>
             <a:off x="329426" y="1210949"/>
-            <a:ext cx="1609223" cy="553998"/>
+            <a:ext cx="1265090" cy="553998"/>
           </a:xfrm>
           <a:prstGeom prst="rect">
             <a:avLst/>
@@ -5334,8 +5331,8 @@
           <a:lstStyle/>
           <a:p>
             <a:r>
-              <a:rPr lang="de-DE" sz="3000" b="1" dirty="0" err="1" smtClean="0"/>
-              <a:t>MAVLink</a:t>
+              <a:rPr lang="de-DE" sz="3000" b="1" dirty="0" smtClean="0"/>
+              <a:t>MCAPI</a:t>
             </a:r>
             <a:endParaRPr lang="de-DE" sz="3000" b="1" dirty="0"/>
           </a:p>
@@ -5561,11 +5558,7 @@
             </a:r>
             <a:r>
               <a:rPr lang="de-DE" sz="2000" dirty="0" smtClean="0"/>
-              <a:t> Project: </a:t>
-            </a:r>
-            <a:r>
-              <a:rPr lang="de-DE" sz="2000" dirty="0" smtClean="0"/>
-              <a:t>Linux</a:t>
+              <a:t> Project: Linux</a:t>
             </a:r>
             <a:endParaRPr lang="de-DE" sz="2000" dirty="0"/>
           </a:p>
@@ -5666,7 +5659,7 @@
     </p:spTree>
     <p:extLst>
       <p:ext uri="{BB962C8B-B14F-4D97-AF65-F5344CB8AC3E}">
-        <p14:creationId xmlns:p14="http://schemas.microsoft.com/office/powerpoint/2010/main" val="2271361562"/>
+        <p14:creationId xmlns:p14="http://schemas.microsoft.com/office/powerpoint/2010/main" val="1791922401"/>
       </p:ext>
     </p:extLst>
   </p:cSld>
@@ -5709,7 +5702,7 @@
         <p:spPr>
           <a:xfrm>
             <a:off x="329426" y="1210949"/>
-            <a:ext cx="2804679" cy="553998"/>
+            <a:ext cx="1609223" cy="553998"/>
           </a:xfrm>
           <a:prstGeom prst="rect">
             <a:avLst/>
@@ -5723,16 +5716,8 @@
           <a:lstStyle/>
           <a:p>
             <a:r>
-              <a:rPr lang="de-DE" sz="3000" b="1" dirty="0" smtClean="0"/>
-              <a:t>Table </a:t>
-            </a:r>
-            <a:r>
               <a:rPr lang="de-DE" sz="3000" b="1" dirty="0" err="1" smtClean="0"/>
-              <a:t>of</a:t>
-            </a:r>
-            <a:r>
-              <a:rPr lang="de-DE" sz="3000" b="1" dirty="0" smtClean="0"/>
-              <a:t> Content</a:t>
+              <a:t>MAVLink</a:t>
             </a:r>
             <a:endParaRPr lang="de-DE" sz="3000" b="1" dirty="0"/>
           </a:p>
@@ -5747,7 +5732,7 @@
         <p:spPr>
           <a:xfrm>
             <a:off x="574957" y="2239909"/>
-            <a:ext cx="3649910" cy="3585597"/>
+            <a:ext cx="3091110" cy="461665"/>
           </a:xfrm>
           <a:prstGeom prst="rect">
             <a:avLst/>
@@ -5760,120 +5745,16 @@
           </a:bodyPr>
           <a:lstStyle/>
           <a:p>
-            <a:pPr marL="342900" indent="-342900">
+            <a:pPr>
               <a:spcAft>
                 <a:spcPts val="600"/>
               </a:spcAft>
-              <a:buFont typeface="Wingdings" panose="05000000000000000000" pitchFamily="2" charset="2"/>
-              <a:buChar char="§"/>
             </a:pPr>
             <a:r>
-              <a:rPr lang="en-GB" sz="2400" dirty="0" smtClean="0"/>
-              <a:t>Project Management</a:t>
-            </a:r>
-          </a:p>
-          <a:p>
-            <a:pPr marL="342900" indent="-342900">
-              <a:spcAft>
-                <a:spcPts val="600"/>
-              </a:spcAft>
-              <a:buFont typeface="Wingdings" panose="05000000000000000000" pitchFamily="2" charset="2"/>
-              <a:buChar char="§"/>
-            </a:pPr>
-            <a:r>
-              <a:rPr lang="en-GB" sz="2400" dirty="0" smtClean="0"/>
-              <a:t>System Architecture</a:t>
-            </a:r>
-          </a:p>
-          <a:p>
-            <a:pPr marL="342900" indent="-342900">
-              <a:spcAft>
-                <a:spcPts val="600"/>
-              </a:spcAft>
-              <a:buFont typeface="Wingdings" panose="05000000000000000000" pitchFamily="2" charset="2"/>
-              <a:buChar char="§"/>
-            </a:pPr>
-            <a:r>
-              <a:rPr lang="en-GB" sz="2400" dirty="0" smtClean="0"/>
-              <a:t>Hardware</a:t>
-            </a:r>
-            <a:endParaRPr lang="en-GB" sz="2400" dirty="0" smtClean="0"/>
-          </a:p>
-          <a:p>
-            <a:pPr marL="342900" indent="-342900">
-              <a:spcAft>
-                <a:spcPts val="600"/>
-              </a:spcAft>
-              <a:buFont typeface="Wingdings" panose="05000000000000000000" pitchFamily="2" charset="2"/>
-              <a:buChar char="§"/>
-            </a:pPr>
-            <a:r>
-              <a:rPr lang="en-GB" sz="2400" dirty="0" smtClean="0"/>
-              <a:t>Linux</a:t>
-            </a:r>
-            <a:endParaRPr lang="en-GB" sz="2400" dirty="0" smtClean="0"/>
-          </a:p>
-          <a:p>
-            <a:pPr marL="342900" indent="-342900">
-              <a:spcAft>
-                <a:spcPts val="600"/>
-              </a:spcAft>
-              <a:buFont typeface="Wingdings" panose="05000000000000000000" pitchFamily="2" charset="2"/>
-              <a:buChar char="§"/>
-            </a:pPr>
-            <a:r>
-              <a:rPr lang="en-GB" sz="2400" b="1" dirty="0" smtClean="0">
-                <a:solidFill>
-                  <a:schemeClr val="accent5"/>
-                </a:solidFill>
-              </a:rPr>
-              <a:t>Flight Controller</a:t>
-            </a:r>
-            <a:endParaRPr lang="en-GB" sz="2400" b="1" dirty="0" smtClean="0">
-              <a:solidFill>
-                <a:schemeClr val="accent5"/>
-              </a:solidFill>
-            </a:endParaRPr>
-          </a:p>
-          <a:p>
-            <a:pPr marL="342900" indent="-342900">
-              <a:spcAft>
-                <a:spcPts val="600"/>
-              </a:spcAft>
-              <a:buFont typeface="Wingdings" panose="05000000000000000000" pitchFamily="2" charset="2"/>
-              <a:buChar char="§"/>
-            </a:pPr>
-            <a:r>
-              <a:rPr lang="en-GB" sz="2400" dirty="0" smtClean="0"/>
-              <a:t>Conclusion</a:t>
-            </a:r>
-          </a:p>
-          <a:p>
-            <a:pPr marL="342900" indent="-342900">
-              <a:spcAft>
-                <a:spcPts val="600"/>
-              </a:spcAft>
-              <a:buFont typeface="Wingdings" panose="05000000000000000000" pitchFamily="2" charset="2"/>
-              <a:buChar char="§"/>
-            </a:pPr>
-            <a:r>
-              <a:rPr lang="en-GB" sz="2400" dirty="0" smtClean="0"/>
-              <a:t>Challenges</a:t>
-            </a:r>
-          </a:p>
-          <a:p>
-            <a:pPr marL="342900" indent="-342900">
-              <a:spcAft>
-                <a:spcPts val="600"/>
-              </a:spcAft>
-              <a:buFont typeface="Wingdings" panose="05000000000000000000" pitchFamily="2" charset="2"/>
-              <a:buChar char="§"/>
-            </a:pPr>
-            <a:r>
-              <a:rPr lang="en-GB" sz="2400" dirty="0" smtClean="0"/>
-              <a:t>Lessons Learned</a:t>
-            </a:r>
-            <a:endParaRPr lang="en-GB" sz="2400" dirty="0"/>
+              <a:rPr lang="de-DE" sz="2400" dirty="0" err="1" smtClean="0"/>
+              <a:t>TEXTtextTEXT</a:t>
+            </a:r>
+            <a:endParaRPr lang="de-DE" sz="2400" dirty="0"/>
           </a:p>
         </p:txBody>
       </p:sp>
@@ -5892,6 +5773,7 @@
             <a:off x="4479500" y="6349470"/>
             <a:ext cx="363641" cy="365125"/>
           </a:xfrm>
+          <a:noFill/>
         </p:spPr>
         <p:txBody>
           <a:bodyPr/>
@@ -6038,7 +5920,7 @@
         <p:spPr>
           <a:xfrm>
             <a:off x="329426" y="190237"/>
-            <a:ext cx="4260141" cy="400110"/>
+            <a:ext cx="3017173" cy="400110"/>
           </a:xfrm>
           <a:prstGeom prst="rect">
             <a:avLst/>
@@ -6061,15 +5943,7 @@
             </a:r>
             <a:r>
               <a:rPr lang="de-DE" sz="2000" dirty="0" smtClean="0"/>
-              <a:t> Project: Table </a:t>
-            </a:r>
-            <a:r>
-              <a:rPr lang="de-DE" sz="2000" dirty="0" err="1" smtClean="0"/>
-              <a:t>of</a:t>
-            </a:r>
-            <a:r>
-              <a:rPr lang="de-DE" sz="2000" dirty="0" smtClean="0"/>
-              <a:t> Content</a:t>
+              <a:t> Project: Linux</a:t>
             </a:r>
             <a:endParaRPr lang="de-DE" sz="2000" dirty="0"/>
           </a:p>
@@ -6170,7 +6044,7 @@
     </p:spTree>
     <p:extLst>
       <p:ext uri="{BB962C8B-B14F-4D97-AF65-F5344CB8AC3E}">
-        <p14:creationId xmlns:p14="http://schemas.microsoft.com/office/powerpoint/2010/main" val="3396287224"/>
+        <p14:creationId xmlns:p14="http://schemas.microsoft.com/office/powerpoint/2010/main" val="2271361562"/>
       </p:ext>
     </p:extLst>
   </p:cSld>
@@ -6301,7 +6175,6 @@
               <a:rPr lang="en-GB" sz="2400" dirty="0" smtClean="0"/>
               <a:t>Hardware</a:t>
             </a:r>
-            <a:endParaRPr lang="en-GB" sz="2400" dirty="0" smtClean="0"/>
           </a:p>
           <a:p>
             <a:pPr marL="342900" indent="-342900">
@@ -6315,7 +6188,6 @@
               <a:rPr lang="en-GB" sz="2400" dirty="0" smtClean="0"/>
               <a:t>Linux</a:t>
             </a:r>
-            <a:endParaRPr lang="en-GB" sz="2400" dirty="0" smtClean="0"/>
           </a:p>
           <a:p>
             <a:pPr marL="342900" indent="-342900">
@@ -6326,10 +6198,13 @@
               <a:buChar char="§"/>
             </a:pPr>
             <a:r>
-              <a:rPr lang="en-GB" sz="2400" dirty="0" smtClean="0"/>
+              <a:rPr lang="en-GB" sz="2400" b="1" dirty="0" smtClean="0">
+                <a:solidFill>
+                  <a:schemeClr val="accent5"/>
+                </a:solidFill>
+              </a:rPr>
               <a:t>Flight Controller</a:t>
             </a:r>
-            <a:endParaRPr lang="en-GB" sz="2400" dirty="0" smtClean="0"/>
           </a:p>
           <a:p>
             <a:pPr marL="342900" indent="-342900">
@@ -6340,11 +6215,7 @@
               <a:buChar char="§"/>
             </a:pPr>
             <a:r>
-              <a:rPr lang="en-GB" sz="2400" b="1" dirty="0" smtClean="0">
-                <a:solidFill>
-                  <a:schemeClr val="accent5"/>
-                </a:solidFill>
-              </a:rPr>
+              <a:rPr lang="en-GB" sz="2400" dirty="0" smtClean="0"/>
               <a:t>Conclusion</a:t>
             </a:r>
           </a:p>
@@ -6670,7 +6541,7 @@
     </p:spTree>
     <p:extLst>
       <p:ext uri="{BB962C8B-B14F-4D97-AF65-F5344CB8AC3E}">
-        <p14:creationId xmlns:p14="http://schemas.microsoft.com/office/powerpoint/2010/main" val="29697348"/>
+        <p14:creationId xmlns:p14="http://schemas.microsoft.com/office/powerpoint/2010/main" val="3396287224"/>
       </p:ext>
     </p:extLst>
   </p:cSld>
@@ -6801,7 +6672,6 @@
               <a:rPr lang="en-GB" sz="2400" dirty="0" smtClean="0"/>
               <a:t>Hardware</a:t>
             </a:r>
-            <a:endParaRPr lang="en-GB" sz="2400" dirty="0" smtClean="0"/>
           </a:p>
           <a:p>
             <a:pPr marL="342900" indent="-342900">
@@ -6815,7 +6685,6 @@
               <a:rPr lang="en-GB" sz="2400" dirty="0" smtClean="0"/>
               <a:t>Linux</a:t>
             </a:r>
-            <a:endParaRPr lang="en-GB" sz="2400" dirty="0" smtClean="0"/>
           </a:p>
           <a:p>
             <a:pPr marL="342900" indent="-342900">
@@ -6829,7 +6698,6 @@
               <a:rPr lang="en-GB" sz="2400" dirty="0" smtClean="0"/>
               <a:t>Flight Controller</a:t>
             </a:r>
-            <a:endParaRPr lang="en-GB" sz="2400" dirty="0" smtClean="0"/>
           </a:p>
           <a:p>
             <a:pPr marL="342900" indent="-342900">
@@ -6840,7 +6708,11 @@
               <a:buChar char="§"/>
             </a:pPr>
             <a:r>
-              <a:rPr lang="en-GB" sz="2400" dirty="0" smtClean="0"/>
+              <a:rPr lang="en-GB" sz="2400" b="1" dirty="0" smtClean="0">
+                <a:solidFill>
+                  <a:schemeClr val="accent5"/>
+                </a:solidFill>
+              </a:rPr>
               <a:t>Conclusion</a:t>
             </a:r>
           </a:p>
@@ -6853,11 +6725,7 @@
               <a:buChar char="§"/>
             </a:pPr>
             <a:r>
-              <a:rPr lang="en-GB" sz="2400" b="1" dirty="0" smtClean="0">
-                <a:solidFill>
-                  <a:schemeClr val="accent5"/>
-                </a:solidFill>
-              </a:rPr>
+              <a:rPr lang="en-GB" sz="2400" dirty="0" smtClean="0"/>
               <a:t>Challenges</a:t>
             </a:r>
           </a:p>
@@ -7170,7 +7038,7 @@
     </p:spTree>
     <p:extLst>
       <p:ext uri="{BB962C8B-B14F-4D97-AF65-F5344CB8AC3E}">
-        <p14:creationId xmlns:p14="http://schemas.microsoft.com/office/powerpoint/2010/main" val="2517285083"/>
+        <p14:creationId xmlns:p14="http://schemas.microsoft.com/office/powerpoint/2010/main" val="29697348"/>
       </p:ext>
     </p:extLst>
   </p:cSld>
@@ -7301,7 +7169,6 @@
               <a:rPr lang="en-GB" sz="2400" dirty="0" smtClean="0"/>
               <a:t>Hardware</a:t>
             </a:r>
-            <a:endParaRPr lang="en-GB" sz="2400" dirty="0" smtClean="0"/>
           </a:p>
           <a:p>
             <a:pPr marL="342900" indent="-342900">
@@ -7315,7 +7182,6 @@
               <a:rPr lang="en-GB" sz="2400" dirty="0" smtClean="0"/>
               <a:t>Linux</a:t>
             </a:r>
-            <a:endParaRPr lang="en-GB" sz="2400" dirty="0" smtClean="0"/>
           </a:p>
           <a:p>
             <a:pPr marL="342900" indent="-342900">
@@ -7329,7 +7195,6 @@
               <a:rPr lang="en-GB" sz="2400" dirty="0" smtClean="0"/>
               <a:t>Flight Controller</a:t>
             </a:r>
-            <a:endParaRPr lang="en-GB" sz="2400" dirty="0" smtClean="0"/>
           </a:p>
           <a:p>
             <a:pPr marL="342900" indent="-342900">
@@ -7353,7 +7218,11 @@
               <a:buChar char="§"/>
             </a:pPr>
             <a:r>
-              <a:rPr lang="en-GB" sz="2400" dirty="0" smtClean="0"/>
+              <a:rPr lang="en-GB" sz="2400" b="1" dirty="0" smtClean="0">
+                <a:solidFill>
+                  <a:schemeClr val="accent5"/>
+                </a:solidFill>
+              </a:rPr>
               <a:t>Challenges</a:t>
             </a:r>
           </a:p>
@@ -7366,18 +7235,10 @@
               <a:buChar char="§"/>
             </a:pPr>
             <a:r>
-              <a:rPr lang="en-GB" sz="2400" b="1" dirty="0" smtClean="0">
-                <a:solidFill>
-                  <a:schemeClr val="accent5"/>
-                </a:solidFill>
-              </a:rPr>
+              <a:rPr lang="en-GB" sz="2400" dirty="0" smtClean="0"/>
               <a:t>Lessons Learned</a:t>
             </a:r>
-            <a:endParaRPr lang="en-GB" sz="2400" b="1" dirty="0">
-              <a:solidFill>
-                <a:schemeClr val="accent5"/>
-              </a:solidFill>
-            </a:endParaRPr>
+            <a:endParaRPr lang="en-GB" sz="2400" dirty="0"/>
           </a:p>
         </p:txBody>
       </p:sp>
@@ -7674,7 +7535,7 @@
     </p:spTree>
     <p:extLst>
       <p:ext uri="{BB962C8B-B14F-4D97-AF65-F5344CB8AC3E}">
-        <p14:creationId xmlns:p14="http://schemas.microsoft.com/office/powerpoint/2010/main" val="1572270163"/>
+        <p14:creationId xmlns:p14="http://schemas.microsoft.com/office/powerpoint/2010/main" val="2517285083"/>
       </p:ext>
     </p:extLst>
   </p:cSld>
@@ -7717,7 +7578,7 @@
         <p:spPr>
           <a:xfrm>
             <a:off x="329426" y="1210949"/>
-            <a:ext cx="1010598" cy="553998"/>
+            <a:ext cx="2804679" cy="553998"/>
           </a:xfrm>
           <a:prstGeom prst="rect">
             <a:avLst/>
@@ -7732,7 +7593,15 @@
           <a:p>
             <a:r>
               <a:rPr lang="de-DE" sz="3000" b="1" dirty="0" smtClean="0"/>
-              <a:t>Topic</a:t>
+              <a:t>Table </a:t>
+            </a:r>
+            <a:r>
+              <a:rPr lang="de-DE" sz="3000" b="1" dirty="0" err="1" smtClean="0"/>
+              <a:t>of</a:t>
+            </a:r>
+            <a:r>
+              <a:rPr lang="de-DE" sz="3000" b="1" dirty="0" smtClean="0"/>
+              <a:t> Content</a:t>
             </a:r>
             <a:endParaRPr lang="de-DE" sz="3000" b="1" dirty="0"/>
           </a:p>
@@ -7747,7 +7616,7 @@
         <p:spPr>
           <a:xfrm>
             <a:off x="574957" y="2239909"/>
-            <a:ext cx="3091110" cy="461665"/>
+            <a:ext cx="3649910" cy="3585597"/>
           </a:xfrm>
           <a:prstGeom prst="rect">
             <a:avLst/>
@@ -7760,16 +7629,117 @@
           </a:bodyPr>
           <a:lstStyle/>
           <a:p>
-            <a:pPr>
+            <a:pPr marL="342900" indent="-342900">
               <a:spcAft>
                 <a:spcPts val="600"/>
               </a:spcAft>
+              <a:buFont typeface="Wingdings" panose="05000000000000000000" pitchFamily="2" charset="2"/>
+              <a:buChar char="§"/>
             </a:pPr>
             <a:r>
-              <a:rPr lang="de-DE" sz="2400" dirty="0" err="1" smtClean="0"/>
-              <a:t>TEXTtextTEXT</a:t>
-            </a:r>
-            <a:endParaRPr lang="de-DE" sz="2400" dirty="0"/>
+              <a:rPr lang="en-GB" sz="2400" dirty="0" smtClean="0"/>
+              <a:t>Project Management</a:t>
+            </a:r>
+          </a:p>
+          <a:p>
+            <a:pPr marL="342900" indent="-342900">
+              <a:spcAft>
+                <a:spcPts val="600"/>
+              </a:spcAft>
+              <a:buFont typeface="Wingdings" panose="05000000000000000000" pitchFamily="2" charset="2"/>
+              <a:buChar char="§"/>
+            </a:pPr>
+            <a:r>
+              <a:rPr lang="en-GB" sz="2400" dirty="0" smtClean="0"/>
+              <a:t>System Architecture</a:t>
+            </a:r>
+          </a:p>
+          <a:p>
+            <a:pPr marL="342900" indent="-342900">
+              <a:spcAft>
+                <a:spcPts val="600"/>
+              </a:spcAft>
+              <a:buFont typeface="Wingdings" panose="05000000000000000000" pitchFamily="2" charset="2"/>
+              <a:buChar char="§"/>
+            </a:pPr>
+            <a:r>
+              <a:rPr lang="en-GB" sz="2400" dirty="0" smtClean="0"/>
+              <a:t>Hardware</a:t>
+            </a:r>
+          </a:p>
+          <a:p>
+            <a:pPr marL="342900" indent="-342900">
+              <a:spcAft>
+                <a:spcPts val="600"/>
+              </a:spcAft>
+              <a:buFont typeface="Wingdings" panose="05000000000000000000" pitchFamily="2" charset="2"/>
+              <a:buChar char="§"/>
+            </a:pPr>
+            <a:r>
+              <a:rPr lang="en-GB" sz="2400" dirty="0" smtClean="0"/>
+              <a:t>Linux</a:t>
+            </a:r>
+          </a:p>
+          <a:p>
+            <a:pPr marL="342900" indent="-342900">
+              <a:spcAft>
+                <a:spcPts val="600"/>
+              </a:spcAft>
+              <a:buFont typeface="Wingdings" panose="05000000000000000000" pitchFamily="2" charset="2"/>
+              <a:buChar char="§"/>
+            </a:pPr>
+            <a:r>
+              <a:rPr lang="en-GB" sz="2400" dirty="0" smtClean="0"/>
+              <a:t>Flight Controller</a:t>
+            </a:r>
+          </a:p>
+          <a:p>
+            <a:pPr marL="342900" indent="-342900">
+              <a:spcAft>
+                <a:spcPts val="600"/>
+              </a:spcAft>
+              <a:buFont typeface="Wingdings" panose="05000000000000000000" pitchFamily="2" charset="2"/>
+              <a:buChar char="§"/>
+            </a:pPr>
+            <a:r>
+              <a:rPr lang="en-GB" sz="2400" dirty="0" smtClean="0"/>
+              <a:t>Conclusion</a:t>
+            </a:r>
+          </a:p>
+          <a:p>
+            <a:pPr marL="342900" indent="-342900">
+              <a:spcAft>
+                <a:spcPts val="600"/>
+              </a:spcAft>
+              <a:buFont typeface="Wingdings" panose="05000000000000000000" pitchFamily="2" charset="2"/>
+              <a:buChar char="§"/>
+            </a:pPr>
+            <a:r>
+              <a:rPr lang="en-GB" sz="2400" dirty="0" smtClean="0"/>
+              <a:t>Challenges</a:t>
+            </a:r>
+          </a:p>
+          <a:p>
+            <a:pPr marL="342900" indent="-342900">
+              <a:spcAft>
+                <a:spcPts val="600"/>
+              </a:spcAft>
+              <a:buFont typeface="Wingdings" panose="05000000000000000000" pitchFamily="2" charset="2"/>
+              <a:buChar char="§"/>
+            </a:pPr>
+            <a:r>
+              <a:rPr lang="en-GB" sz="2400" b="1" dirty="0" smtClean="0">
+                <a:solidFill>
+                  <a:schemeClr val="accent5"/>
+                </a:solidFill>
+              </a:rPr>
+              <a:t>Lessons Learned</a:t>
+            </a:r>
+            <a:endParaRPr lang="en-GB" sz="2400" b="1" dirty="0">
+              <a:solidFill>
+                <a:schemeClr val="accent5"/>
+              </a:solidFill>
+            </a:endParaRPr>
           </a:p>
         </p:txBody>
       </p:sp>
@@ -7802,6 +7772,398 @@
               </a:rPr>
               <a:pPr algn="ctr"/>
               <a:t>16</a:t>
+            </a:fld>
+            <a:endParaRPr lang="de-DE" b="1" dirty="0">
+              <a:solidFill>
+                <a:schemeClr val="accent5"/>
+              </a:solidFill>
+            </a:endParaRPr>
+          </a:p>
+        </p:txBody>
+      </p:sp>
+      <p:pic>
+        <p:nvPicPr>
+          <p:cNvPr id="9" name="Picture 8"/>
+          <p:cNvPicPr>
+            <a:picLocks noChangeAspect="1"/>
+          </p:cNvPicPr>
+          <p:nvPr/>
+        </p:nvPicPr>
+        <p:blipFill>
+          <a:blip r:embed="rId3" cstate="print">
+            <a:extLst>
+              <a:ext uri="{28A0092B-C50C-407E-A947-70E740481C1C}">
+                <a14:useLocalDpi xmlns:a14="http://schemas.microsoft.com/office/drawing/2010/main" val="0"/>
+              </a:ext>
+            </a:extLst>
+          </a:blip>
+          <a:stretch>
+            <a:fillRect/>
+          </a:stretch>
+        </p:blipFill>
+        <p:spPr>
+          <a:xfrm>
+            <a:off x="7800967" y="0"/>
+            <a:ext cx="1232964" cy="838415"/>
+          </a:xfrm>
+          <a:prstGeom prst="rect">
+            <a:avLst/>
+          </a:prstGeom>
+        </p:spPr>
+      </p:pic>
+      <p:sp>
+        <p:nvSpPr>
+          <p:cNvPr id="10" name="TextBox 9"/>
+          <p:cNvSpPr txBox="1"/>
+          <p:nvPr/>
+        </p:nvSpPr>
+        <p:spPr>
+          <a:xfrm>
+            <a:off x="7804107" y="838415"/>
+            <a:ext cx="1229824" cy="461665"/>
+          </a:xfrm>
+          <a:prstGeom prst="rect">
+            <a:avLst/>
+          </a:prstGeom>
+          <a:noFill/>
+        </p:spPr>
+        <p:txBody>
+          <a:bodyPr wrap="none" rtlCol="0">
+            <a:spAutoFit/>
+          </a:bodyPr>
+          <a:lstStyle/>
+          <a:p>
+            <a:pPr algn="ctr"/>
+            <a:r>
+              <a:rPr lang="en-US" sz="1200" dirty="0" smtClean="0"/>
+              <a:t>University of</a:t>
+            </a:r>
+          </a:p>
+          <a:p>
+            <a:pPr algn="ctr"/>
+            <a:r>
+              <a:rPr lang="en-US" sz="1200" dirty="0" smtClean="0"/>
+              <a:t>Applied Sciences</a:t>
+            </a:r>
+            <a:endParaRPr lang="en-US" sz="1200" dirty="0"/>
+          </a:p>
+        </p:txBody>
+      </p:sp>
+      <p:sp>
+        <p:nvSpPr>
+          <p:cNvPr id="11" name="Rectangle 10"/>
+          <p:cNvSpPr/>
+          <p:nvPr/>
+        </p:nvSpPr>
+        <p:spPr>
+          <a:xfrm>
+            <a:off x="-1" y="728141"/>
+            <a:ext cx="7501467" cy="144959"/>
+          </a:xfrm>
+          <a:prstGeom prst="rect">
+            <a:avLst/>
+          </a:prstGeom>
+          <a:solidFill>
+            <a:schemeClr val="accent1"/>
+          </a:solidFill>
+          <a:ln>
+            <a:noFill/>
+          </a:ln>
+        </p:spPr>
+        <p:style>
+          <a:lnRef idx="2">
+            <a:schemeClr val="accent1">
+              <a:shade val="50000"/>
+            </a:schemeClr>
+          </a:lnRef>
+          <a:fillRef idx="1">
+            <a:schemeClr val="accent1"/>
+          </a:fillRef>
+          <a:effectRef idx="0">
+            <a:schemeClr val="accent1"/>
+          </a:effectRef>
+          <a:fontRef idx="minor">
+            <a:schemeClr val="lt1"/>
+          </a:fontRef>
+        </p:style>
+        <p:txBody>
+          <a:bodyPr rtlCol="0" anchor="ctr"/>
+          <a:lstStyle/>
+          <a:p>
+            <a:pPr algn="ctr"/>
+            <a:endParaRPr lang="de-DE"/>
+          </a:p>
+        </p:txBody>
+      </p:sp>
+      <p:sp>
+        <p:nvSpPr>
+          <p:cNvPr id="12" name="TextBox 11"/>
+          <p:cNvSpPr txBox="1"/>
+          <p:nvPr/>
+        </p:nvSpPr>
+        <p:spPr>
+          <a:xfrm>
+            <a:off x="329426" y="190237"/>
+            <a:ext cx="4260141" cy="400110"/>
+          </a:xfrm>
+          <a:prstGeom prst="rect">
+            <a:avLst/>
+          </a:prstGeom>
+          <a:noFill/>
+        </p:spPr>
+        <p:txBody>
+          <a:bodyPr wrap="none" rtlCol="0">
+            <a:spAutoFit/>
+          </a:bodyPr>
+          <a:lstStyle/>
+          <a:p>
+            <a:r>
+              <a:rPr lang="de-DE" sz="2000" dirty="0" smtClean="0"/>
+              <a:t>The X-</a:t>
+            </a:r>
+            <a:r>
+              <a:rPr lang="de-DE" sz="2000" dirty="0" err="1" smtClean="0"/>
+              <a:t>Copter</a:t>
+            </a:r>
+            <a:r>
+              <a:rPr lang="de-DE" sz="2000" dirty="0" smtClean="0"/>
+              <a:t> Project: Table </a:t>
+            </a:r>
+            <a:r>
+              <a:rPr lang="de-DE" sz="2000" dirty="0" err="1" smtClean="0"/>
+              <a:t>of</a:t>
+            </a:r>
+            <a:r>
+              <a:rPr lang="de-DE" sz="2000" dirty="0" smtClean="0"/>
+              <a:t> Content</a:t>
+            </a:r>
+            <a:endParaRPr lang="de-DE" sz="2000" dirty="0"/>
+          </a:p>
+        </p:txBody>
+      </p:sp>
+      <p:sp>
+        <p:nvSpPr>
+          <p:cNvPr id="14" name="Rectangle 13"/>
+          <p:cNvSpPr/>
+          <p:nvPr/>
+        </p:nvSpPr>
+        <p:spPr>
+          <a:xfrm>
+            <a:off x="0" y="6493933"/>
+            <a:ext cx="4479501" cy="76200"/>
+          </a:xfrm>
+          <a:prstGeom prst="rect">
+            <a:avLst/>
+          </a:prstGeom>
+          <a:solidFill>
+            <a:schemeClr val="accent1"/>
+          </a:solidFill>
+          <a:ln>
+            <a:noFill/>
+          </a:ln>
+        </p:spPr>
+        <p:style>
+          <a:lnRef idx="2">
+            <a:schemeClr val="accent1">
+              <a:shade val="50000"/>
+            </a:schemeClr>
+          </a:lnRef>
+          <a:fillRef idx="1">
+            <a:schemeClr val="accent1"/>
+          </a:fillRef>
+          <a:effectRef idx="0">
+            <a:schemeClr val="accent1"/>
+          </a:effectRef>
+          <a:fontRef idx="minor">
+            <a:schemeClr val="lt1"/>
+          </a:fontRef>
+        </p:style>
+        <p:txBody>
+          <a:bodyPr rtlCol="0" anchor="ctr"/>
+          <a:lstStyle/>
+          <a:p>
+            <a:pPr algn="ctr"/>
+            <a:endParaRPr lang="de-DE"/>
+          </a:p>
+        </p:txBody>
+      </p:sp>
+      <p:sp>
+        <p:nvSpPr>
+          <p:cNvPr id="15" name="Rectangle 14"/>
+          <p:cNvSpPr/>
+          <p:nvPr/>
+        </p:nvSpPr>
+        <p:spPr>
+          <a:xfrm>
+            <a:off x="4859443" y="6493933"/>
+            <a:ext cx="4287092" cy="76200"/>
+          </a:xfrm>
+          <a:prstGeom prst="rect">
+            <a:avLst/>
+          </a:prstGeom>
+          <a:solidFill>
+            <a:schemeClr val="accent1"/>
+          </a:solidFill>
+          <a:ln>
+            <a:noFill/>
+          </a:ln>
+        </p:spPr>
+        <p:style>
+          <a:lnRef idx="2">
+            <a:schemeClr val="accent1">
+              <a:shade val="50000"/>
+            </a:schemeClr>
+          </a:lnRef>
+          <a:fillRef idx="1">
+            <a:schemeClr val="accent1"/>
+          </a:fillRef>
+          <a:effectRef idx="0">
+            <a:schemeClr val="accent1"/>
+          </a:effectRef>
+          <a:fontRef idx="minor">
+            <a:schemeClr val="lt1"/>
+          </a:fontRef>
+        </p:style>
+        <p:txBody>
+          <a:bodyPr rtlCol="0" anchor="ctr"/>
+          <a:lstStyle/>
+          <a:p>
+            <a:pPr algn="ctr"/>
+            <a:endParaRPr lang="de-DE"/>
+          </a:p>
+        </p:txBody>
+      </p:sp>
+    </p:spTree>
+    <p:extLst>
+      <p:ext uri="{BB962C8B-B14F-4D97-AF65-F5344CB8AC3E}">
+        <p14:creationId xmlns:p14="http://schemas.microsoft.com/office/powerpoint/2010/main" val="1572270163"/>
+      </p:ext>
+    </p:extLst>
+  </p:cSld>
+  <p:clrMapOvr>
+    <a:masterClrMapping/>
+  </p:clrMapOvr>
+  <p:timing>
+    <p:tnLst>
+      <p:par>
+        <p:cTn id="1" dur="indefinite" restart="never" nodeType="tmRoot"/>
+      </p:par>
+    </p:tnLst>
+  </p:timing>
+</p:sld>
+</file>
+
+<file path=ppt/slides/slide17.xml><?xml version="1.0" encoding="utf-8"?>
+<p:sld xmlns:a="http://schemas.openxmlformats.org/drawingml/2006/main" xmlns:r="http://schemas.openxmlformats.org/officeDocument/2006/relationships" xmlns:p="http://schemas.openxmlformats.org/presentationml/2006/main">
+  <p:cSld>
+    <p:spTree>
+      <p:nvGrpSpPr>
+        <p:cNvPr id="1" name=""/>
+        <p:cNvGrpSpPr/>
+        <p:nvPr/>
+      </p:nvGrpSpPr>
+      <p:grpSpPr>
+        <a:xfrm>
+          <a:off x="0" y="0"/>
+          <a:ext cx="0" cy="0"/>
+          <a:chOff x="0" y="0"/>
+          <a:chExt cx="0" cy="0"/>
+        </a:xfrm>
+      </p:grpSpPr>
+      <p:sp>
+        <p:nvSpPr>
+          <p:cNvPr id="5" name="TextBox 4"/>
+          <p:cNvSpPr txBox="1"/>
+          <p:nvPr/>
+        </p:nvSpPr>
+        <p:spPr>
+          <a:xfrm>
+            <a:off x="329426" y="1210949"/>
+            <a:ext cx="1010598" cy="553998"/>
+          </a:xfrm>
+          <a:prstGeom prst="rect">
+            <a:avLst/>
+          </a:prstGeom>
+          <a:noFill/>
+        </p:spPr>
+        <p:txBody>
+          <a:bodyPr wrap="none" rtlCol="0">
+            <a:spAutoFit/>
+          </a:bodyPr>
+          <a:lstStyle/>
+          <a:p>
+            <a:r>
+              <a:rPr lang="de-DE" sz="3000" b="1" dirty="0" smtClean="0"/>
+              <a:t>Topic</a:t>
+            </a:r>
+            <a:endParaRPr lang="de-DE" sz="3000" b="1" dirty="0"/>
+          </a:p>
+        </p:txBody>
+      </p:sp>
+      <p:sp>
+        <p:nvSpPr>
+          <p:cNvPr id="7" name="TextBox 6"/>
+          <p:cNvSpPr txBox="1"/>
+          <p:nvPr/>
+        </p:nvSpPr>
+        <p:spPr>
+          <a:xfrm>
+            <a:off x="574957" y="2239909"/>
+            <a:ext cx="3091110" cy="461665"/>
+          </a:xfrm>
+          <a:prstGeom prst="rect">
+            <a:avLst/>
+          </a:prstGeom>
+          <a:noFill/>
+        </p:spPr>
+        <p:txBody>
+          <a:bodyPr wrap="square" rtlCol="0">
+            <a:spAutoFit/>
+          </a:bodyPr>
+          <a:lstStyle/>
+          <a:p>
+            <a:pPr>
+              <a:spcAft>
+                <a:spcPts val="600"/>
+              </a:spcAft>
+            </a:pPr>
+            <a:r>
+              <a:rPr lang="de-DE" sz="2400" dirty="0" err="1" smtClean="0"/>
+              <a:t>TEXTtextTEXT</a:t>
+            </a:r>
+            <a:endParaRPr lang="de-DE" sz="2400" dirty="0"/>
+          </a:p>
+        </p:txBody>
+      </p:sp>
+      <p:sp>
+        <p:nvSpPr>
+          <p:cNvPr id="8" name="Slide Number Placeholder 7"/>
+          <p:cNvSpPr>
+            <a:spLocks noGrp="1"/>
+          </p:cNvSpPr>
+          <p:nvPr>
+            <p:ph type="sldNum" sz="quarter" idx="12"/>
+          </p:nvPr>
+        </p:nvSpPr>
+        <p:spPr>
+          <a:xfrm>
+            <a:off x="4479500" y="6349470"/>
+            <a:ext cx="363641" cy="365125"/>
+          </a:xfrm>
+        </p:spPr>
+        <p:txBody>
+          <a:bodyPr/>
+          <a:lstStyle/>
+          <a:p>
+            <a:pPr algn="ctr"/>
+            <a:fld id="{E2CFAF74-B2E6-4153-882D-B5265360E8DB}" type="slidenum">
+              <a:rPr lang="de-DE" sz="1350" b="1" smtClean="0">
+                <a:solidFill>
+                  <a:schemeClr val="accent5"/>
+                </a:solidFill>
+              </a:rPr>
+              <a:pPr algn="ctr"/>
+              <a:t>17</a:t>
             </a:fld>
             <a:endParaRPr lang="de-DE" b="1" dirty="0">
               <a:solidFill>
@@ -8586,7 +8948,6 @@
               <a:rPr lang="en-GB" sz="2400" dirty="0" smtClean="0"/>
               <a:t>Hardware</a:t>
             </a:r>
-            <a:endParaRPr lang="en-GB" sz="2400" dirty="0" smtClean="0"/>
           </a:p>
           <a:p>
             <a:pPr marL="342900" indent="-342900">
@@ -8600,7 +8961,6 @@
               <a:rPr lang="en-GB" sz="2400" dirty="0" smtClean="0"/>
               <a:t>Linux</a:t>
             </a:r>
-            <a:endParaRPr lang="en-GB" sz="2400" dirty="0" smtClean="0"/>
           </a:p>
           <a:p>
             <a:pPr marL="342900" indent="-342900">
@@ -8614,7 +8974,6 @@
               <a:rPr lang="en-GB" sz="2400" dirty="0" smtClean="0"/>
               <a:t>Flight Controller</a:t>
             </a:r>
-            <a:endParaRPr lang="en-GB" sz="2400" dirty="0" smtClean="0"/>
           </a:p>
           <a:p>
             <a:pPr marL="342900" indent="-342900">
@@ -9086,7 +9445,6 @@
               <a:rPr lang="en-GB" sz="2400" dirty="0" smtClean="0"/>
               <a:t>Hardware</a:t>
             </a:r>
-            <a:endParaRPr lang="en-GB" sz="2400" dirty="0" smtClean="0"/>
           </a:p>
           <a:p>
             <a:pPr marL="342900" indent="-342900">
@@ -9100,7 +9458,6 @@
               <a:rPr lang="en-GB" sz="2400" dirty="0" smtClean="0"/>
               <a:t>Linux</a:t>
             </a:r>
-            <a:endParaRPr lang="en-GB" sz="2400" dirty="0" smtClean="0"/>
           </a:p>
           <a:p>
             <a:pPr marL="342900" indent="-342900">
@@ -9114,7 +9471,6 @@
               <a:rPr lang="en-GB" sz="2400" dirty="0" smtClean="0"/>
               <a:t>Flight Controller</a:t>
             </a:r>
-            <a:endParaRPr lang="en-GB" sz="2400" dirty="0" smtClean="0"/>
           </a:p>
           <a:p>
             <a:pPr marL="342900" indent="-342900">
@@ -9586,7 +9942,6 @@
               <a:rPr lang="en-GB" sz="2400" dirty="0" smtClean="0"/>
               <a:t>Hardware</a:t>
             </a:r>
-            <a:endParaRPr lang="en-GB" sz="2400" dirty="0" smtClean="0"/>
           </a:p>
           <a:p>
             <a:pPr marL="342900" indent="-342900">
@@ -9600,7 +9955,6 @@
               <a:rPr lang="en-GB" sz="2400" dirty="0" smtClean="0"/>
               <a:t>Linux</a:t>
             </a:r>
-            <a:endParaRPr lang="en-GB" sz="2400" dirty="0" smtClean="0"/>
           </a:p>
           <a:p>
             <a:pPr marL="342900" indent="-342900">
@@ -9614,7 +9968,6 @@
               <a:rPr lang="en-GB" sz="2400" dirty="0" smtClean="0"/>
               <a:t>Flight Controller</a:t>
             </a:r>
-            <a:endParaRPr lang="en-GB" sz="2400" dirty="0" smtClean="0"/>
           </a:p>
           <a:p>
             <a:pPr marL="342900" indent="-342900">
@@ -9987,229 +10340,44 @@
       </p:grpSpPr>
       <p:sp>
         <p:nvSpPr>
-          <p:cNvPr id="5" name="TextBox 4"/>
-          <p:cNvSpPr txBox="1"/>
-          <p:nvPr/>
-        </p:nvSpPr>
-        <p:spPr>
-          <a:xfrm>
-            <a:off x="329426" y="1210949"/>
-            <a:ext cx="2804679" cy="553998"/>
-          </a:xfrm>
-          <a:prstGeom prst="rect">
-            <a:avLst/>
-          </a:prstGeom>
-          <a:noFill/>
-        </p:spPr>
-        <p:txBody>
-          <a:bodyPr wrap="none" rtlCol="0">
-            <a:spAutoFit/>
-          </a:bodyPr>
-          <a:lstStyle/>
-          <a:p>
-            <a:r>
-              <a:rPr lang="de-DE" sz="3000" b="1" dirty="0" smtClean="0"/>
-              <a:t>Table </a:t>
-            </a:r>
-            <a:r>
-              <a:rPr lang="de-DE" sz="3000" b="1" dirty="0" err="1" smtClean="0"/>
-              <a:t>of</a:t>
-            </a:r>
-            <a:r>
-              <a:rPr lang="de-DE" sz="3000" b="1" dirty="0" smtClean="0"/>
-              <a:t> Content</a:t>
-            </a:r>
-            <a:endParaRPr lang="de-DE" sz="3000" b="1" dirty="0"/>
-          </a:p>
-        </p:txBody>
-      </p:sp>
-      <p:sp>
-        <p:nvSpPr>
-          <p:cNvPr id="7" name="TextBox 6"/>
-          <p:cNvSpPr txBox="1"/>
-          <p:nvPr/>
-        </p:nvSpPr>
-        <p:spPr>
-          <a:xfrm>
-            <a:off x="574957" y="2239909"/>
-            <a:ext cx="3649910" cy="3585597"/>
-          </a:xfrm>
-          <a:prstGeom prst="rect">
-            <a:avLst/>
-          </a:prstGeom>
-          <a:noFill/>
-        </p:spPr>
-        <p:txBody>
-          <a:bodyPr wrap="square" rtlCol="0">
-            <a:spAutoFit/>
-          </a:bodyPr>
-          <a:lstStyle/>
-          <a:p>
-            <a:pPr marL="342900" indent="-342900">
-              <a:spcAft>
-                <a:spcPts val="600"/>
-              </a:spcAft>
-              <a:buFont typeface="Wingdings" panose="05000000000000000000" pitchFamily="2" charset="2"/>
-              <a:buChar char="§"/>
-            </a:pPr>
-            <a:r>
-              <a:rPr lang="en-GB" sz="2400" dirty="0" smtClean="0"/>
-              <a:t>Project Management</a:t>
-            </a:r>
-          </a:p>
-          <a:p>
-            <a:pPr marL="342900" indent="-342900">
-              <a:spcAft>
-                <a:spcPts val="600"/>
-              </a:spcAft>
-              <a:buFont typeface="Wingdings" panose="05000000000000000000" pitchFamily="2" charset="2"/>
-              <a:buChar char="§"/>
-            </a:pPr>
-            <a:r>
-              <a:rPr lang="en-GB" sz="2400" dirty="0" smtClean="0"/>
+          <p:cNvPr id="2" name="Title 1"/>
+          <p:cNvSpPr>
+            <a:spLocks noGrp="1"/>
+          </p:cNvSpPr>
+          <p:nvPr>
+            <p:ph type="title"/>
+          </p:nvPr>
+        </p:nvSpPr>
+        <p:spPr>
+          <a:xfrm>
+            <a:off x="508000" y="0"/>
+            <a:ext cx="7886700" cy="1325563"/>
+          </a:xfrm>
+        </p:spPr>
+        <p:txBody>
+          <a:bodyPr/>
+          <a:lstStyle/>
+          <a:p>
+            <a:r>
+              <a:rPr lang="en-US" dirty="0" smtClean="0"/>
               <a:t>System Architecture</a:t>
             </a:r>
-          </a:p>
-          <a:p>
-            <a:pPr marL="342900" indent="-342900">
-              <a:spcAft>
-                <a:spcPts val="600"/>
-              </a:spcAft>
-              <a:buFont typeface="Wingdings" panose="05000000000000000000" pitchFamily="2" charset="2"/>
-              <a:buChar char="§"/>
-            </a:pPr>
-            <a:r>
-              <a:rPr lang="en-GB" sz="2400" b="1" dirty="0" smtClean="0">
-                <a:solidFill>
-                  <a:schemeClr val="accent5"/>
-                </a:solidFill>
-              </a:rPr>
-              <a:t>Hardware</a:t>
-            </a:r>
-            <a:endParaRPr lang="en-GB" sz="2400" b="1" dirty="0" smtClean="0">
-              <a:solidFill>
-                <a:schemeClr val="accent5"/>
-              </a:solidFill>
-            </a:endParaRPr>
-          </a:p>
-          <a:p>
-            <a:pPr marL="342900" indent="-342900">
-              <a:spcAft>
-                <a:spcPts val="600"/>
-              </a:spcAft>
-              <a:buFont typeface="Wingdings" panose="05000000000000000000" pitchFamily="2" charset="2"/>
-              <a:buChar char="§"/>
-            </a:pPr>
-            <a:r>
-              <a:rPr lang="en-GB" sz="2400" dirty="0" smtClean="0"/>
-              <a:t>Linux</a:t>
-            </a:r>
-            <a:endParaRPr lang="en-GB" sz="2400" dirty="0" smtClean="0"/>
-          </a:p>
-          <a:p>
-            <a:pPr marL="342900" indent="-342900">
-              <a:spcAft>
-                <a:spcPts val="600"/>
-              </a:spcAft>
-              <a:buFont typeface="Wingdings" panose="05000000000000000000" pitchFamily="2" charset="2"/>
-              <a:buChar char="§"/>
-            </a:pPr>
-            <a:r>
-              <a:rPr lang="en-GB" sz="2400" dirty="0" smtClean="0"/>
-              <a:t>Flight Controller</a:t>
-            </a:r>
-            <a:endParaRPr lang="en-GB" sz="2400" dirty="0" smtClean="0"/>
-          </a:p>
-          <a:p>
-            <a:pPr marL="342900" indent="-342900">
-              <a:spcAft>
-                <a:spcPts val="600"/>
-              </a:spcAft>
-              <a:buFont typeface="Wingdings" panose="05000000000000000000" pitchFamily="2" charset="2"/>
-              <a:buChar char="§"/>
-            </a:pPr>
-            <a:r>
-              <a:rPr lang="en-GB" sz="2400" dirty="0" smtClean="0"/>
-              <a:t>Conclusion</a:t>
-            </a:r>
-          </a:p>
-          <a:p>
-            <a:pPr marL="342900" indent="-342900">
-              <a:spcAft>
-                <a:spcPts val="600"/>
-              </a:spcAft>
-              <a:buFont typeface="Wingdings" panose="05000000000000000000" pitchFamily="2" charset="2"/>
-              <a:buChar char="§"/>
-            </a:pPr>
-            <a:r>
-              <a:rPr lang="en-GB" sz="2400" dirty="0" smtClean="0"/>
-              <a:t>Challenges</a:t>
-            </a:r>
-          </a:p>
-          <a:p>
-            <a:pPr marL="342900" indent="-342900">
-              <a:spcAft>
-                <a:spcPts val="600"/>
-              </a:spcAft>
-              <a:buFont typeface="Wingdings" panose="05000000000000000000" pitchFamily="2" charset="2"/>
-              <a:buChar char="§"/>
-            </a:pPr>
-            <a:r>
-              <a:rPr lang="en-GB" sz="2400" dirty="0" smtClean="0"/>
-              <a:t>Lessons Learned</a:t>
-            </a:r>
-            <a:endParaRPr lang="en-GB" sz="2400" dirty="0"/>
-          </a:p>
-        </p:txBody>
-      </p:sp>
-      <p:sp>
-        <p:nvSpPr>
-          <p:cNvPr id="8" name="Slide Number Placeholder 7"/>
-          <p:cNvSpPr>
-            <a:spLocks noGrp="1"/>
-          </p:cNvSpPr>
-          <p:nvPr>
-            <p:ph type="sldNum" sz="quarter" idx="12"/>
-          </p:nvPr>
-        </p:nvSpPr>
-        <p:spPr>
-          <a:xfrm>
-            <a:off x="4479500" y="6349470"/>
-            <a:ext cx="363641" cy="365125"/>
-          </a:xfrm>
-        </p:spPr>
-        <p:txBody>
-          <a:bodyPr/>
-          <a:lstStyle/>
-          <a:p>
-            <a:pPr algn="ctr"/>
-            <a:fld id="{E2CFAF74-B2E6-4153-882D-B5265360E8DB}" type="slidenum">
-              <a:rPr lang="de-DE" sz="1350" b="1" smtClean="0">
-                <a:solidFill>
-                  <a:schemeClr val="accent5"/>
-                </a:solidFill>
-              </a:rPr>
-              <a:pPr algn="ctr"/>
-              <a:t>6</a:t>
-            </a:fld>
-            <a:endParaRPr lang="de-DE" b="1" dirty="0">
-              <a:solidFill>
-                <a:schemeClr val="accent5"/>
-              </a:solidFill>
-            </a:endParaRPr>
+            <a:endParaRPr lang="de-DE" dirty="0"/>
           </a:p>
         </p:txBody>
       </p:sp>
       <p:pic>
         <p:nvPicPr>
-          <p:cNvPr id="9" name="Picture 8"/>
+          <p:cNvPr id="5" name="Content Placeholder 4"/>
           <p:cNvPicPr>
-            <a:picLocks noChangeAspect="1"/>
+            <a:picLocks noGrp="1" noChangeAspect="1"/>
           </p:cNvPicPr>
-          <p:nvPr/>
+          <p:nvPr>
+            <p:ph idx="1"/>
+          </p:nvPr>
         </p:nvPicPr>
         <p:blipFill>
-          <a:blip r:embed="rId3" cstate="print">
+          <a:blip r:embed="rId2">
             <a:extLst>
               <a:ext uri="{28A0092B-C50C-407E-A947-70E740481C1C}">
                 <a14:useLocalDpi xmlns:a14="http://schemas.microsoft.com/office/drawing/2010/main" val="0"/>
@@ -10222,232 +10390,30 @@
         </p:blipFill>
         <p:spPr>
           <a:xfrm>
-            <a:off x="7800967" y="0"/>
-            <a:ext cx="1232964" cy="838415"/>
-          </a:xfrm>
-          <a:prstGeom prst="rect">
-            <a:avLst/>
-          </a:prstGeom>
+            <a:off x="508000" y="1237458"/>
+            <a:ext cx="8356600" cy="5484018"/>
+          </a:xfrm>
         </p:spPr>
       </p:pic>
       <p:sp>
         <p:nvSpPr>
-          <p:cNvPr id="10" name="TextBox 9"/>
-          <p:cNvSpPr txBox="1"/>
-          <p:nvPr/>
-        </p:nvSpPr>
-        <p:spPr>
-          <a:xfrm>
-            <a:off x="7804107" y="838415"/>
-            <a:ext cx="1229824" cy="461665"/>
-          </a:xfrm>
-          <a:prstGeom prst="rect">
-            <a:avLst/>
-          </a:prstGeom>
-          <a:noFill/>
-        </p:spPr>
-        <p:txBody>
-          <a:bodyPr wrap="none" rtlCol="0">
-            <a:spAutoFit/>
-          </a:bodyPr>
-          <a:lstStyle/>
-          <a:p>
-            <a:pPr algn="ctr"/>
-            <a:r>
-              <a:rPr lang="en-US" sz="1200" dirty="0" smtClean="0"/>
-              <a:t>University of</a:t>
-            </a:r>
-          </a:p>
-          <a:p>
-            <a:pPr algn="ctr"/>
-            <a:r>
-              <a:rPr lang="en-US" sz="1200" dirty="0" smtClean="0"/>
-              <a:t>Applied Sciences</a:t>
-            </a:r>
-            <a:endParaRPr lang="en-US" sz="1200" dirty="0"/>
-          </a:p>
-        </p:txBody>
-      </p:sp>
-      <p:sp>
-        <p:nvSpPr>
-          <p:cNvPr id="11" name="Rectangle 10"/>
-          <p:cNvSpPr/>
-          <p:nvPr/>
-        </p:nvSpPr>
-        <p:spPr>
-          <a:xfrm>
-            <a:off x="-1" y="728141"/>
-            <a:ext cx="7501467" cy="144959"/>
-          </a:xfrm>
-          <a:prstGeom prst="rect">
-            <a:avLst/>
-          </a:prstGeom>
-          <a:solidFill>
-            <a:schemeClr val="accent1"/>
-          </a:solidFill>
-          <a:ln>
-            <a:noFill/>
-          </a:ln>
-        </p:spPr>
-        <p:style>
-          <a:lnRef idx="2">
-            <a:schemeClr val="accent1">
-              <a:shade val="50000"/>
-            </a:schemeClr>
-          </a:lnRef>
-          <a:fillRef idx="1">
-            <a:schemeClr val="accent1"/>
-          </a:fillRef>
-          <a:effectRef idx="0">
-            <a:schemeClr val="accent1"/>
-          </a:effectRef>
-          <a:fontRef idx="minor">
-            <a:schemeClr val="lt1"/>
-          </a:fontRef>
-        </p:style>
-        <p:txBody>
-          <a:bodyPr rtlCol="0" anchor="ctr"/>
-          <a:lstStyle/>
-          <a:p>
-            <a:pPr algn="ctr"/>
-            <a:endParaRPr lang="de-DE"/>
-          </a:p>
-        </p:txBody>
-      </p:sp>
-      <p:sp>
-        <p:nvSpPr>
-          <p:cNvPr id="12" name="TextBox 11"/>
-          <p:cNvSpPr txBox="1"/>
-          <p:nvPr/>
-        </p:nvSpPr>
-        <p:spPr>
-          <a:xfrm>
-            <a:off x="329426" y="190237"/>
-            <a:ext cx="4260141" cy="400110"/>
-          </a:xfrm>
-          <a:prstGeom prst="rect">
-            <a:avLst/>
-          </a:prstGeom>
-          <a:noFill/>
-        </p:spPr>
-        <p:txBody>
-          <a:bodyPr wrap="none" rtlCol="0">
-            <a:spAutoFit/>
-          </a:bodyPr>
-          <a:lstStyle/>
-          <a:p>
-            <a:r>
-              <a:rPr lang="de-DE" sz="2000" dirty="0" smtClean="0"/>
-              <a:t>The X-</a:t>
-            </a:r>
-            <a:r>
-              <a:rPr lang="de-DE" sz="2000" dirty="0" err="1" smtClean="0"/>
-              <a:t>Copter</a:t>
-            </a:r>
-            <a:r>
-              <a:rPr lang="de-DE" sz="2000" dirty="0" smtClean="0"/>
-              <a:t> Project: Table </a:t>
-            </a:r>
-            <a:r>
-              <a:rPr lang="de-DE" sz="2000" dirty="0" err="1" smtClean="0"/>
-              <a:t>of</a:t>
-            </a:r>
-            <a:r>
-              <a:rPr lang="de-DE" sz="2000" dirty="0" smtClean="0"/>
-              <a:t> Content</a:t>
-            </a:r>
-            <a:endParaRPr lang="de-DE" sz="2000" dirty="0"/>
-          </a:p>
-        </p:txBody>
-      </p:sp>
-      <p:sp>
-        <p:nvSpPr>
-          <p:cNvPr id="14" name="Rectangle 13"/>
-          <p:cNvSpPr/>
-          <p:nvPr/>
-        </p:nvSpPr>
-        <p:spPr>
-          <a:xfrm>
-            <a:off x="0" y="6493933"/>
-            <a:ext cx="4479501" cy="76200"/>
-          </a:xfrm>
-          <a:prstGeom prst="rect">
-            <a:avLst/>
-          </a:prstGeom>
-          <a:solidFill>
-            <a:schemeClr val="accent1"/>
-          </a:solidFill>
-          <a:ln>
-            <a:noFill/>
-          </a:ln>
-        </p:spPr>
-        <p:style>
-          <a:lnRef idx="2">
-            <a:schemeClr val="accent1">
-              <a:shade val="50000"/>
-            </a:schemeClr>
-          </a:lnRef>
-          <a:fillRef idx="1">
-            <a:schemeClr val="accent1"/>
-          </a:fillRef>
-          <a:effectRef idx="0">
-            <a:schemeClr val="accent1"/>
-          </a:effectRef>
-          <a:fontRef idx="minor">
-            <a:schemeClr val="lt1"/>
-          </a:fontRef>
-        </p:style>
-        <p:txBody>
-          <a:bodyPr rtlCol="0" anchor="ctr"/>
-          <a:lstStyle/>
-          <a:p>
-            <a:pPr algn="ctr"/>
-            <a:endParaRPr lang="de-DE"/>
-          </a:p>
-        </p:txBody>
-      </p:sp>
-      <p:sp>
-        <p:nvSpPr>
-          <p:cNvPr id="15" name="Rectangle 14"/>
-          <p:cNvSpPr/>
-          <p:nvPr/>
-        </p:nvSpPr>
-        <p:spPr>
-          <a:xfrm>
-            <a:off x="4859443" y="6493933"/>
-            <a:ext cx="4287092" cy="76200"/>
-          </a:xfrm>
-          <a:prstGeom prst="rect">
-            <a:avLst/>
-          </a:prstGeom>
-          <a:solidFill>
-            <a:schemeClr val="accent1"/>
-          </a:solidFill>
-          <a:ln>
-            <a:noFill/>
-          </a:ln>
-        </p:spPr>
-        <p:style>
-          <a:lnRef idx="2">
-            <a:schemeClr val="accent1">
-              <a:shade val="50000"/>
-            </a:schemeClr>
-          </a:lnRef>
-          <a:fillRef idx="1">
-            <a:schemeClr val="accent1"/>
-          </a:fillRef>
-          <a:effectRef idx="0">
-            <a:schemeClr val="accent1"/>
-          </a:effectRef>
-          <a:fontRef idx="minor">
-            <a:schemeClr val="lt1"/>
-          </a:fontRef>
-        </p:style>
-        <p:txBody>
-          <a:bodyPr rtlCol="0" anchor="ctr"/>
-          <a:lstStyle/>
-          <a:p>
-            <a:pPr algn="ctr"/>
+          <p:cNvPr id="4" name="Slide Number Placeholder 3"/>
+          <p:cNvSpPr>
+            <a:spLocks noGrp="1"/>
+          </p:cNvSpPr>
+          <p:nvPr>
+            <p:ph type="sldNum" sz="quarter" idx="12"/>
+          </p:nvPr>
+        </p:nvSpPr>
+        <p:spPr/>
+        <p:txBody>
+          <a:bodyPr/>
+          <a:lstStyle/>
+          <a:p>
+            <a:fld id="{72B6104D-EF2B-4EC6-8AC8-64340A9AC981}" type="slidenum">
+              <a:rPr lang="de-DE" smtClean="0"/>
+              <a:t>6</a:t>
+            </a:fld>
             <a:endParaRPr lang="de-DE"/>
           </a:p>
         </p:txBody>
@@ -10455,7 +10421,7 @@
     </p:spTree>
     <p:extLst>
       <p:ext uri="{BB962C8B-B14F-4D97-AF65-F5344CB8AC3E}">
-        <p14:creationId xmlns:p14="http://schemas.microsoft.com/office/powerpoint/2010/main" val="1222149915"/>
+        <p14:creationId xmlns:p14="http://schemas.microsoft.com/office/powerpoint/2010/main" val="2123573077"/>
       </p:ext>
     </p:extLst>
   </p:cSld>
@@ -10583,10 +10549,13 @@
               <a:buChar char="§"/>
             </a:pPr>
             <a:r>
-              <a:rPr lang="en-GB" sz="2400" dirty="0" smtClean="0"/>
+              <a:rPr lang="en-GB" sz="2400" b="1" dirty="0" smtClean="0">
+                <a:solidFill>
+                  <a:schemeClr val="accent5"/>
+                </a:solidFill>
+              </a:rPr>
               <a:t>Hardware</a:t>
             </a:r>
-            <a:endParaRPr lang="en-GB" sz="2400" dirty="0" smtClean="0"/>
           </a:p>
           <a:p>
             <a:pPr marL="342900" indent="-342900">
@@ -10597,18 +10566,9 @@
               <a:buChar char="§"/>
             </a:pPr>
             <a:r>
-              <a:rPr lang="en-GB" sz="2400" b="1" dirty="0" smtClean="0">
-                <a:solidFill>
-                  <a:schemeClr val="accent5"/>
-                </a:solidFill>
-              </a:rPr>
+              <a:rPr lang="en-GB" sz="2400" dirty="0" smtClean="0"/>
               <a:t>Linux</a:t>
             </a:r>
-            <a:endParaRPr lang="en-GB" sz="2400" b="1" dirty="0" smtClean="0">
-              <a:solidFill>
-                <a:schemeClr val="accent5"/>
-              </a:solidFill>
-            </a:endParaRPr>
           </a:p>
           <a:p>
             <a:pPr marL="342900" indent="-342900">
@@ -10622,7 +10582,6 @@
               <a:rPr lang="en-GB" sz="2400" dirty="0" smtClean="0"/>
               <a:t>Flight Controller</a:t>
             </a:r>
-            <a:endParaRPr lang="en-GB" sz="2400" dirty="0" smtClean="0"/>
           </a:p>
           <a:p>
             <a:pPr marL="342900" indent="-342900">
@@ -10959,7 +10918,7 @@
     </p:spTree>
     <p:extLst>
       <p:ext uri="{BB962C8B-B14F-4D97-AF65-F5344CB8AC3E}">
-        <p14:creationId xmlns:p14="http://schemas.microsoft.com/office/powerpoint/2010/main" val="1756241290"/>
+        <p14:creationId xmlns:p14="http://schemas.microsoft.com/office/powerpoint/2010/main" val="1222149915"/>
       </p:ext>
     </p:extLst>
   </p:cSld>
@@ -11002,7 +10961,7 @@
         <p:spPr>
           <a:xfrm>
             <a:off x="329426" y="1210949"/>
-            <a:ext cx="1681999" cy="553998"/>
+            <a:ext cx="2804679" cy="553998"/>
           </a:xfrm>
           <a:prstGeom prst="rect">
             <a:avLst/>
@@ -11016,8 +10975,16 @@
           <a:lstStyle/>
           <a:p>
             <a:r>
+              <a:rPr lang="de-DE" sz="3000" b="1" dirty="0" smtClean="0"/>
+              <a:t>Table </a:t>
+            </a:r>
+            <a:r>
               <a:rPr lang="de-DE" sz="3000" b="1" dirty="0" err="1" smtClean="0"/>
-              <a:t>Buildroot</a:t>
+              <a:t>of</a:t>
+            </a:r>
+            <a:r>
+              <a:rPr lang="de-DE" sz="3000" b="1" dirty="0" smtClean="0"/>
+              <a:t> Content</a:t>
             </a:r>
             <a:endParaRPr lang="de-DE" sz="3000" b="1" dirty="0"/>
           </a:p>
@@ -11032,7 +10999,7 @@
         <p:spPr>
           <a:xfrm>
             <a:off x="574957" y="2239909"/>
-            <a:ext cx="3091110" cy="461665"/>
+            <a:ext cx="3649910" cy="3585597"/>
           </a:xfrm>
           <a:prstGeom prst="rect">
             <a:avLst/>
@@ -11045,16 +11012,113 @@
           </a:bodyPr>
           <a:lstStyle/>
           <a:p>
-            <a:pPr>
+            <a:pPr marL="342900" indent="-342900">
               <a:spcAft>
                 <a:spcPts val="600"/>
               </a:spcAft>
+              <a:buFont typeface="Wingdings" panose="05000000000000000000" pitchFamily="2" charset="2"/>
+              <a:buChar char="§"/>
             </a:pPr>
             <a:r>
-              <a:rPr lang="de-DE" sz="2400" dirty="0" err="1" smtClean="0"/>
-              <a:t>TEXTtextTEXT</a:t>
-            </a:r>
-            <a:endParaRPr lang="de-DE" sz="2400" dirty="0"/>
+              <a:rPr lang="en-GB" sz="2400" dirty="0" smtClean="0"/>
+              <a:t>Project Management</a:t>
+            </a:r>
+          </a:p>
+          <a:p>
+            <a:pPr marL="342900" indent="-342900">
+              <a:spcAft>
+                <a:spcPts val="600"/>
+              </a:spcAft>
+              <a:buFont typeface="Wingdings" panose="05000000000000000000" pitchFamily="2" charset="2"/>
+              <a:buChar char="§"/>
+            </a:pPr>
+            <a:r>
+              <a:rPr lang="en-GB" sz="2400" dirty="0" smtClean="0"/>
+              <a:t>System Architecture</a:t>
+            </a:r>
+          </a:p>
+          <a:p>
+            <a:pPr marL="342900" indent="-342900">
+              <a:spcAft>
+                <a:spcPts val="600"/>
+              </a:spcAft>
+              <a:buFont typeface="Wingdings" panose="05000000000000000000" pitchFamily="2" charset="2"/>
+              <a:buChar char="§"/>
+            </a:pPr>
+            <a:r>
+              <a:rPr lang="en-GB" sz="2400" dirty="0" smtClean="0"/>
+              <a:t>Hardware</a:t>
+            </a:r>
+          </a:p>
+          <a:p>
+            <a:pPr marL="342900" indent="-342900">
+              <a:spcAft>
+                <a:spcPts val="600"/>
+              </a:spcAft>
+              <a:buFont typeface="Wingdings" panose="05000000000000000000" pitchFamily="2" charset="2"/>
+              <a:buChar char="§"/>
+            </a:pPr>
+            <a:r>
+              <a:rPr lang="en-GB" sz="2400" b="1" dirty="0" smtClean="0">
+                <a:solidFill>
+                  <a:schemeClr val="accent5"/>
+                </a:solidFill>
+              </a:rPr>
+              <a:t>Linux</a:t>
+            </a:r>
+          </a:p>
+          <a:p>
+            <a:pPr marL="342900" indent="-342900">
+              <a:spcAft>
+                <a:spcPts val="600"/>
+              </a:spcAft>
+              <a:buFont typeface="Wingdings" panose="05000000000000000000" pitchFamily="2" charset="2"/>
+              <a:buChar char="§"/>
+            </a:pPr>
+            <a:r>
+              <a:rPr lang="en-GB" sz="2400" dirty="0" smtClean="0"/>
+              <a:t>Flight Controller</a:t>
+            </a:r>
+          </a:p>
+          <a:p>
+            <a:pPr marL="342900" indent="-342900">
+              <a:spcAft>
+                <a:spcPts val="600"/>
+              </a:spcAft>
+              <a:buFont typeface="Wingdings" panose="05000000000000000000" pitchFamily="2" charset="2"/>
+              <a:buChar char="§"/>
+            </a:pPr>
+            <a:r>
+              <a:rPr lang="en-GB" sz="2400" dirty="0" smtClean="0"/>
+              <a:t>Conclusion</a:t>
+            </a:r>
+          </a:p>
+          <a:p>
+            <a:pPr marL="342900" indent="-342900">
+              <a:spcAft>
+                <a:spcPts val="600"/>
+              </a:spcAft>
+              <a:buFont typeface="Wingdings" panose="05000000000000000000" pitchFamily="2" charset="2"/>
+              <a:buChar char="§"/>
+            </a:pPr>
+            <a:r>
+              <a:rPr lang="en-GB" sz="2400" dirty="0" smtClean="0"/>
+              <a:t>Challenges</a:t>
+            </a:r>
+          </a:p>
+          <a:p>
+            <a:pPr marL="342900" indent="-342900">
+              <a:spcAft>
+                <a:spcPts val="600"/>
+              </a:spcAft>
+              <a:buFont typeface="Wingdings" panose="05000000000000000000" pitchFamily="2" charset="2"/>
+              <a:buChar char="§"/>
+            </a:pPr>
+            <a:r>
+              <a:rPr lang="en-GB" sz="2400" dirty="0" smtClean="0"/>
+              <a:t>Lessons Learned</a:t>
+            </a:r>
+            <a:endParaRPr lang="en-GB" sz="2400" dirty="0"/>
           </a:p>
         </p:txBody>
       </p:sp>
@@ -11073,7 +11137,6 @@
             <a:off x="4479500" y="6349470"/>
             <a:ext cx="363641" cy="365125"/>
           </a:xfrm>
-          <a:noFill/>
         </p:spPr>
         <p:txBody>
           <a:bodyPr/>
@@ -11220,7 +11283,7 @@
         <p:spPr>
           <a:xfrm>
             <a:off x="329426" y="190237"/>
-            <a:ext cx="3017173" cy="400110"/>
+            <a:ext cx="4260141" cy="400110"/>
           </a:xfrm>
           <a:prstGeom prst="rect">
             <a:avLst/>
@@ -11243,11 +11306,15 @@
             </a:r>
             <a:r>
               <a:rPr lang="de-DE" sz="2000" dirty="0" smtClean="0"/>
-              <a:t> Project: </a:t>
+              <a:t> Project: Table </a:t>
+            </a:r>
+            <a:r>
+              <a:rPr lang="de-DE" sz="2000" dirty="0" err="1" smtClean="0"/>
+              <a:t>of</a:t>
             </a:r>
             <a:r>
               <a:rPr lang="de-DE" sz="2000" dirty="0" smtClean="0"/>
-              <a:t>Linux</a:t>
+              <a:t> Content</a:t>
             </a:r>
             <a:endParaRPr lang="de-DE" sz="2000" dirty="0"/>
           </a:p>
@@ -11348,7 +11415,7 @@
     </p:spTree>
     <p:extLst>
       <p:ext uri="{BB962C8B-B14F-4D97-AF65-F5344CB8AC3E}">
-        <p14:creationId xmlns:p14="http://schemas.microsoft.com/office/powerpoint/2010/main" val="1334278751"/>
+        <p14:creationId xmlns:p14="http://schemas.microsoft.com/office/powerpoint/2010/main" val="1756241290"/>
       </p:ext>
     </p:extLst>
   </p:cSld>
@@ -11391,7 +11458,7 @@
         <p:spPr>
           <a:xfrm>
             <a:off x="329426" y="1210949"/>
-            <a:ext cx="1016625" cy="553998"/>
+            <a:ext cx="1681999" cy="553998"/>
           </a:xfrm>
           <a:prstGeom prst="rect">
             <a:avLst/>
@@ -11405,8 +11472,8 @@
           <a:lstStyle/>
           <a:p>
             <a:r>
-              <a:rPr lang="de-DE" sz="3000" b="1" dirty="0" smtClean="0"/>
-              <a:t>Wi-Fi</a:t>
+              <a:rPr lang="de-DE" sz="3000" b="1" dirty="0" err="1" smtClean="0"/>
+              <a:t>Buildroot</a:t>
             </a:r>
             <a:endParaRPr lang="de-DE" sz="3000" b="1" dirty="0"/>
           </a:p>
@@ -11632,11 +11699,7 @@
             </a:r>
             <a:r>
               <a:rPr lang="de-DE" sz="2000" dirty="0" smtClean="0"/>
-              <a:t> Project: </a:t>
-            </a:r>
-            <a:r>
-              <a:rPr lang="de-DE" sz="2000" dirty="0" smtClean="0"/>
-              <a:t>Linux</a:t>
+              <a:t> Project: Linux</a:t>
             </a:r>
             <a:endParaRPr lang="de-DE" sz="2000" dirty="0"/>
           </a:p>
@@ -11737,7 +11800,7 @@
     </p:spTree>
     <p:extLst>
       <p:ext uri="{BB962C8B-B14F-4D97-AF65-F5344CB8AC3E}">
-        <p14:creationId xmlns:p14="http://schemas.microsoft.com/office/powerpoint/2010/main" val="650476055"/>
+        <p14:creationId xmlns:p14="http://schemas.microsoft.com/office/powerpoint/2010/main" val="1334278751"/>
       </p:ext>
     </p:extLst>
   </p:cSld>

</xml_diff>

<commit_message>
SysArch Pic beamer rdy & updated..
</commit_message>
<xml_diff>
--- a/Final_Report/InFinalReportEinpflegen (Fuer Jan)/presentation_sample/sample_01.pptx
+++ b/Final_Report/InFinalReportEinpflegen (Fuer Jan)/presentation_sample/sample_01.pptx
@@ -216,7 +216,7 @@
           <a:p>
             <a:fld id="{01B229FC-51C2-4E1D-A6C4-9B87BE6D84CF}" type="datetimeFigureOut">
               <a:rPr lang="de-DE" smtClean="0"/>
-              <a:t>12.01.2016</a:t>
+              <a:t>13.01.2016</a:t>
             </a:fld>
             <a:endParaRPr lang="de-DE"/>
           </a:p>
@@ -1950,7 +1950,7 @@
           <a:p>
             <a:fld id="{1FAE4487-07F5-4E0C-A698-8DA0B71426E5}" type="datetime1">
               <a:rPr lang="de-DE" smtClean="0"/>
-              <a:t>12.01.2016</a:t>
+              <a:t>13.01.2016</a:t>
             </a:fld>
             <a:endParaRPr lang="de-DE"/>
           </a:p>
@@ -2127,7 +2127,7 @@
           <a:p>
             <a:fld id="{114DA959-4ACD-4AD7-9314-0E260580F78F}" type="datetime1">
               <a:rPr lang="de-DE" smtClean="0"/>
-              <a:t>12.01.2016</a:t>
+              <a:t>13.01.2016</a:t>
             </a:fld>
             <a:endParaRPr lang="de-DE"/>
           </a:p>
@@ -2307,7 +2307,7 @@
           <a:p>
             <a:fld id="{088ED64F-F231-42B8-9DF4-FBE8B4153856}" type="datetime1">
               <a:rPr lang="de-DE" smtClean="0"/>
-              <a:t>12.01.2016</a:t>
+              <a:t>13.01.2016</a:t>
             </a:fld>
             <a:endParaRPr lang="de-DE"/>
           </a:p>
@@ -2508,7 +2508,7 @@
           <a:p>
             <a:fld id="{BC9E8E43-5B1E-49C1-93E3-C4324372C052}" type="datetime1">
               <a:rPr lang="de-DE" smtClean="0"/>
-              <a:t>12.01.2016</a:t>
+              <a:t>13.01.2016</a:t>
             </a:fld>
             <a:endParaRPr lang="de-DE"/>
           </a:p>
@@ -2759,7 +2759,7 @@
           <a:p>
             <a:fld id="{11095117-4153-4ACF-8575-94EE5A5C03B9}" type="datetime1">
               <a:rPr lang="de-DE" smtClean="0"/>
-              <a:t>12.01.2016</a:t>
+              <a:t>13.01.2016</a:t>
             </a:fld>
             <a:endParaRPr lang="de-DE"/>
           </a:p>
@@ -2998,7 +2998,7 @@
           <a:p>
             <a:fld id="{8A8B720F-18D4-413D-88AE-6608935563BC}" type="datetime1">
               <a:rPr lang="de-DE" smtClean="0"/>
-              <a:t>12.01.2016</a:t>
+              <a:t>13.01.2016</a:t>
             </a:fld>
             <a:endParaRPr lang="de-DE"/>
           </a:p>
@@ -3372,7 +3372,7 @@
           <a:p>
             <a:fld id="{85496447-D905-49F1-9148-859E85181723}" type="datetime1">
               <a:rPr lang="de-DE" smtClean="0"/>
-              <a:t>12.01.2016</a:t>
+              <a:t>13.01.2016</a:t>
             </a:fld>
             <a:endParaRPr lang="de-DE"/>
           </a:p>
@@ -3490,7 +3490,7 @@
           <a:p>
             <a:fld id="{8AE86BFB-9D85-4FD2-AD0A-8695AB1040D8}" type="datetime1">
               <a:rPr lang="de-DE" smtClean="0"/>
-              <a:t>12.01.2016</a:t>
+              <a:t>13.01.2016</a:t>
             </a:fld>
             <a:endParaRPr lang="de-DE"/>
           </a:p>
@@ -3585,7 +3585,7 @@
           <a:p>
             <a:fld id="{86B2F9C8-BDAC-4C98-8828-9C3677E43DD3}" type="datetime1">
               <a:rPr lang="de-DE" smtClean="0"/>
-              <a:t>12.01.2016</a:t>
+              <a:t>13.01.2016</a:t>
             </a:fld>
             <a:endParaRPr lang="de-DE"/>
           </a:p>
@@ -3862,7 +3862,7 @@
           <a:p>
             <a:fld id="{FAF8F88E-5A69-4E9C-AA65-970EB9ACAF02}" type="datetime1">
               <a:rPr lang="de-DE" smtClean="0"/>
-              <a:t>12.01.2016</a:t>
+              <a:t>13.01.2016</a:t>
             </a:fld>
             <a:endParaRPr lang="de-DE"/>
           </a:p>
@@ -4030,7 +4030,7 @@
           </a:lstStyle>
           <a:p>
             <a:r>
-              <a:rPr lang="en-US" smtClean="0"/>
+              <a:rPr lang="en-US" dirty="0" smtClean="0"/>
               <a:t>Click icon to add picture</a:t>
             </a:r>
             <a:endParaRPr lang="en-US" dirty="0"/>
@@ -4119,7 +4119,7 @@
           <a:p>
             <a:fld id="{17BA4A9F-EAA1-43E6-AA15-D9BA1C7481F2}" type="datetime1">
               <a:rPr lang="de-DE" smtClean="0"/>
-              <a:t>12.01.2016</a:t>
+              <a:t>13.01.2016</a:t>
             </a:fld>
             <a:endParaRPr lang="de-DE"/>
           </a:p>
@@ -4332,7 +4332,7 @@
           <a:p>
             <a:fld id="{97BF3932-ECB2-46ED-85A1-210C39AF3C79}" type="datetime1">
               <a:rPr lang="de-DE" smtClean="0"/>
-              <a:t>12.01.2016</a:t>
+              <a:t>13.01.2016</a:t>
             </a:fld>
             <a:endParaRPr lang="de-DE"/>
           </a:p>
@@ -10976,7 +10976,7 @@
           <a:lstStyle/>
           <a:p>
             <a:r>
-              <a:rPr lang="en-US" smtClean="0"/>
+              <a:rPr lang="en-US" dirty="0" smtClean="0"/>
               <a:t>Old System Architecture</a:t>
             </a:r>
             <a:endParaRPr lang="de-DE" dirty="0"/>

</xml_diff>